<commit_message>
added new content for my part
</commit_message>
<xml_diff>
--- a/Capstone.pptx
+++ b/Capstone.pptx
@@ -16,11 +16,14 @@
     <p:sldId id="267" r:id="rId10"/>
     <p:sldId id="268" r:id="rId11"/>
     <p:sldId id="260" r:id="rId12"/>
-    <p:sldId id="269" r:id="rId13"/>
-    <p:sldId id="271" r:id="rId14"/>
-    <p:sldId id="270" r:id="rId15"/>
-    <p:sldId id="261" r:id="rId16"/>
-    <p:sldId id="262" r:id="rId17"/>
+    <p:sldId id="272" r:id="rId13"/>
+    <p:sldId id="273" r:id="rId14"/>
+    <p:sldId id="269" r:id="rId15"/>
+    <p:sldId id="271" r:id="rId16"/>
+    <p:sldId id="274" r:id="rId17"/>
+    <p:sldId id="270" r:id="rId18"/>
+    <p:sldId id="261" r:id="rId19"/>
+    <p:sldId id="262" r:id="rId20"/>
   </p:sldIdLst>
   <p:sldSz cx="12192000" cy="6858000"/>
   <p:notesSz cx="6858000" cy="9144000"/>
@@ -710,7 +713,7 @@
           <a:p>
             <a:fld id="{7ED82E05-B906-46D2-B7F0-95A00293E995}" type="datetimeFigureOut">
               <a:rPr lang="en-US" smtClean="0"/>
-              <a:t>8/4/2019</a:t>
+              <a:t>8/26/2019</a:t>
             </a:fld>
             <a:endParaRPr lang="en-US"/>
           </a:p>
@@ -1040,7 +1043,7 @@
           <a:p>
             <a:fld id="{7ED82E05-B906-46D2-B7F0-95A00293E995}" type="datetimeFigureOut">
               <a:rPr lang="en-US" smtClean="0"/>
-              <a:t>8/4/2019</a:t>
+              <a:t>8/26/2019</a:t>
             </a:fld>
             <a:endParaRPr lang="en-US"/>
           </a:p>
@@ -1220,7 +1223,7 @@
           <a:p>
             <a:fld id="{7ED82E05-B906-46D2-B7F0-95A00293E995}" type="datetimeFigureOut">
               <a:rPr lang="en-US" smtClean="0"/>
-              <a:t>8/4/2019</a:t>
+              <a:t>8/26/2019</a:t>
             </a:fld>
             <a:endParaRPr lang="en-US"/>
           </a:p>
@@ -1390,7 +1393,7 @@
           <a:p>
             <a:fld id="{7ED82E05-B906-46D2-B7F0-95A00293E995}" type="datetimeFigureOut">
               <a:rPr lang="en-US" smtClean="0"/>
-              <a:t>8/4/2019</a:t>
+              <a:t>8/26/2019</a:t>
             </a:fld>
             <a:endParaRPr lang="en-US"/>
           </a:p>
@@ -1662,7 +1665,7 @@
           <a:p>
             <a:fld id="{7ED82E05-B906-46D2-B7F0-95A00293E995}" type="datetimeFigureOut">
               <a:rPr lang="en-US" smtClean="0"/>
-              <a:t>8/4/2019</a:t>
+              <a:t>8/26/2019</a:t>
             </a:fld>
             <a:endParaRPr lang="en-US"/>
           </a:p>
@@ -2056,7 +2059,7 @@
           <a:p>
             <a:fld id="{7ED82E05-B906-46D2-B7F0-95A00293E995}" type="datetimeFigureOut">
               <a:rPr lang="en-US" smtClean="0"/>
-              <a:t>8/4/2019</a:t>
+              <a:t>8/26/2019</a:t>
             </a:fld>
             <a:endParaRPr lang="en-US"/>
           </a:p>
@@ -2533,7 +2536,7 @@
           <a:p>
             <a:fld id="{7ED82E05-B906-46D2-B7F0-95A00293E995}" type="datetimeFigureOut">
               <a:rPr lang="en-US" smtClean="0"/>
-              <a:t>8/4/2019</a:t>
+              <a:t>8/26/2019</a:t>
             </a:fld>
             <a:endParaRPr lang="en-US"/>
           </a:p>
@@ -2651,7 +2654,7 @@
           <a:p>
             <a:fld id="{7ED82E05-B906-46D2-B7F0-95A00293E995}" type="datetimeFigureOut">
               <a:rPr lang="en-US" smtClean="0"/>
-              <a:t>8/4/2019</a:t>
+              <a:t>8/26/2019</a:t>
             </a:fld>
             <a:endParaRPr lang="en-US"/>
           </a:p>
@@ -2746,7 +2749,7 @@
           <a:p>
             <a:fld id="{7ED82E05-B906-46D2-B7F0-95A00293E995}" type="datetimeFigureOut">
               <a:rPr lang="en-US" smtClean="0"/>
-              <a:t>8/4/2019</a:t>
+              <a:t>8/26/2019</a:t>
             </a:fld>
             <a:endParaRPr lang="en-US"/>
           </a:p>
@@ -3092,7 +3095,7 @@
           <a:p>
             <a:fld id="{7ED82E05-B906-46D2-B7F0-95A00293E995}" type="datetimeFigureOut">
               <a:rPr lang="en-US" smtClean="0"/>
-              <a:t>8/4/2019</a:t>
+              <a:t>8/26/2019</a:t>
             </a:fld>
             <a:endParaRPr lang="en-US"/>
           </a:p>
@@ -3480,7 +3483,7 @@
           <a:p>
             <a:fld id="{7ED82E05-B906-46D2-B7F0-95A00293E995}" type="datetimeFigureOut">
               <a:rPr lang="en-US" smtClean="0"/>
-              <a:t>8/4/2019</a:t>
+              <a:t>8/26/2019</a:t>
             </a:fld>
             <a:endParaRPr lang="en-US"/>
           </a:p>
@@ -3755,7 +3758,7 @@
           <a:p>
             <a:fld id="{7ED82E05-B906-46D2-B7F0-95A00293E995}" type="datetimeFigureOut">
               <a:rPr lang="en-US" smtClean="0"/>
-              <a:t>8/4/2019</a:t>
+              <a:t>8/26/2019</a:t>
             </a:fld>
             <a:endParaRPr lang="en-US"/>
           </a:p>
@@ -4560,10 +4563,33 @@
         </p:nvSpPr>
         <p:spPr/>
         <p:txBody>
-          <a:bodyPr/>
-          <a:lstStyle/>
-          <a:p>
-            <a:endParaRPr lang="en-US"/>
+          <a:bodyPr>
+            <a:normAutofit/>
+          </a:bodyPr>
+          <a:lstStyle/>
+          <a:p>
+            <a:r>
+              <a:rPr lang="en-US" dirty="0"/>
+              <a:t>Our application includes Three main modules:</a:t>
+            </a:r>
+          </a:p>
+          <a:p>
+            <a:r>
+              <a:rPr lang="en-US" dirty="0"/>
+              <a:t>Main Menu</a:t>
+            </a:r>
+          </a:p>
+          <a:p>
+            <a:r>
+              <a:rPr lang="en-US" dirty="0"/>
+              <a:t>Tour Guide</a:t>
+            </a:r>
+          </a:p>
+          <a:p>
+            <a:r>
+              <a:rPr lang="en-US" dirty="0"/>
+              <a:t>Game Mode</a:t>
+            </a:r>
           </a:p>
         </p:txBody>
       </p:sp>
@@ -4599,10 +4625,10 @@
       </p:grpSpPr>
       <p:sp>
         <p:nvSpPr>
-          <p:cNvPr id="2" name="Title 1">
+          <p:cNvPr id="3" name="Content Placeholder 2">
             <a:extLst>
               <a:ext uri="{FF2B5EF4-FFF2-40B4-BE49-F238E27FC236}">
-                <a16:creationId xmlns:a16="http://schemas.microsoft.com/office/drawing/2014/main" id="{3AE0C9F6-F394-418D-96A4-49626E554771}"/>
+                <a16:creationId xmlns:a16="http://schemas.microsoft.com/office/drawing/2014/main" id="{379FBF68-DC88-4C2D-AED4-BD846653AB4B}"/>
               </a:ext>
             </a:extLst>
           </p:cNvPr>
@@ -4610,50 +4636,137 @@
             <a:spLocks noGrp="1"/>
           </p:cNvSpPr>
           <p:nvPr>
-            <p:ph type="title"/>
-          </p:nvPr>
-        </p:nvSpPr>
-        <p:spPr/>
-        <p:txBody>
-          <a:bodyPr/>
-          <a:lstStyle/>
-          <a:p>
+            <p:ph idx="1"/>
+          </p:nvPr>
+        </p:nvSpPr>
+        <p:spPr>
+          <a:xfrm>
+            <a:off x="1371600" y="590843"/>
+            <a:ext cx="9601200" cy="5753686"/>
+          </a:xfrm>
+        </p:spPr>
+        <p:txBody>
+          <a:bodyPr>
+            <a:normAutofit/>
+          </a:bodyPr>
+          <a:lstStyle/>
+          <a:p>
+            <a:pPr marL="0" indent="0">
+              <a:buNone/>
+            </a:pPr>
+            <a:r>
+              <a:rPr lang="en-US" sz="2400" b="1" dirty="0"/>
+              <a:t>Main Menu Module</a:t>
+            </a:r>
+          </a:p>
+          <a:p>
+            <a:pPr marL="0" indent="0">
+              <a:buNone/>
+            </a:pPr>
             <a:r>
               <a:rPr lang="en-US" dirty="0"/>
-              <a:t>Use case Diagram</a:t>
-            </a:r>
-          </a:p>
-        </p:txBody>
-      </p:sp>
-      <p:sp>
-        <p:nvSpPr>
-          <p:cNvPr id="3" name="Content Placeholder 2">
-            <a:extLst>
-              <a:ext uri="{FF2B5EF4-FFF2-40B4-BE49-F238E27FC236}">
-                <a16:creationId xmlns:a16="http://schemas.microsoft.com/office/drawing/2014/main" id="{60780DC7-6E0C-499C-B432-5D3FAE7733F5}"/>
-              </a:ext>
-            </a:extLst>
-          </p:cNvPr>
-          <p:cNvSpPr>
-            <a:spLocks noGrp="1"/>
-          </p:cNvSpPr>
-          <p:nvPr>
-            <p:ph idx="1"/>
-          </p:nvPr>
-        </p:nvSpPr>
-        <p:spPr/>
-        <p:txBody>
-          <a:bodyPr/>
-          <a:lstStyle/>
-          <a:p>
-            <a:endParaRPr lang="en-US"/>
+              <a:t>R1: The application shall allow user to select Tour Guide/Game or Exit the application</a:t>
+            </a:r>
+          </a:p>
+          <a:p>
+            <a:pPr marL="0" indent="0">
+              <a:buNone/>
+            </a:pPr>
+            <a:endParaRPr lang="en-US" dirty="0"/>
+          </a:p>
+          <a:p>
+            <a:pPr marL="0" indent="0">
+              <a:buNone/>
+            </a:pPr>
+            <a:r>
+              <a:rPr lang="en-US" sz="2400" b="1" dirty="0"/>
+              <a:t>Tour Guide</a:t>
+            </a:r>
+          </a:p>
+          <a:p>
+            <a:pPr marL="0" indent="0">
+              <a:buNone/>
+            </a:pPr>
+            <a:r>
+              <a:rPr lang="en-US" dirty="0"/>
+              <a:t>R2: The application shall guide the user with robot companion.</a:t>
+            </a:r>
+          </a:p>
+          <a:p>
+            <a:pPr marL="0" indent="0">
+              <a:buNone/>
+            </a:pPr>
+            <a:r>
+              <a:rPr lang="en-US" dirty="0"/>
+              <a:t>R3: The application shall pass the user through all the water cycle phases.</a:t>
+            </a:r>
+          </a:p>
+          <a:p>
+            <a:pPr marL="0" indent="0">
+              <a:buNone/>
+            </a:pPr>
+            <a:r>
+              <a:rPr lang="en-US" dirty="0"/>
+              <a:t>R4: The application shall allow user to look around. </a:t>
+            </a:r>
+          </a:p>
+          <a:p>
+            <a:pPr marL="0" indent="0">
+              <a:buNone/>
+            </a:pPr>
+            <a:r>
+              <a:rPr lang="en-US" dirty="0"/>
+              <a:t> </a:t>
+            </a:r>
+          </a:p>
+          <a:p>
+            <a:pPr marL="0" indent="0">
+              <a:buNone/>
+            </a:pPr>
+            <a:r>
+              <a:rPr lang="en-US" sz="2400" b="1" dirty="0"/>
+              <a:t>Mini Game:</a:t>
+            </a:r>
+          </a:p>
+          <a:p>
+            <a:pPr marL="0" indent="0">
+              <a:buNone/>
+            </a:pPr>
+            <a:r>
+              <a:rPr lang="en-US" dirty="0"/>
+              <a:t>R5: The application shall allow user to move player as needed.</a:t>
+            </a:r>
+          </a:p>
+          <a:p>
+            <a:pPr marL="0" indent="0">
+              <a:buNone/>
+            </a:pPr>
+            <a:r>
+              <a:rPr lang="en-US" dirty="0"/>
+              <a:t>R6: The application shall limit user gameplay time.</a:t>
+            </a:r>
+          </a:p>
+          <a:p>
+            <a:pPr marL="0" indent="0">
+              <a:buNone/>
+            </a:pPr>
+            <a:r>
+              <a:rPr lang="en-US" dirty="0"/>
+              <a:t>R7: The application must record user gameplay time for high score.</a:t>
+            </a:r>
+          </a:p>
+          <a:p>
+            <a:pPr marL="0" indent="0">
+              <a:buNone/>
+            </a:pPr>
+            <a:endParaRPr lang="en-US" dirty="0"/>
           </a:p>
         </p:txBody>
       </p:sp>
     </p:spTree>
     <p:extLst>
       <p:ext uri="{BB962C8B-B14F-4D97-AF65-F5344CB8AC3E}">
-        <p14:creationId xmlns:p14="http://schemas.microsoft.com/office/powerpoint/2010/main" val="2053961645"/>
+        <p14:creationId xmlns:p14="http://schemas.microsoft.com/office/powerpoint/2010/main" val="2689985128"/>
       </p:ext>
     </p:extLst>
   </p:cSld>
@@ -4685,7 +4798,7 @@
           <p:cNvPr id="2" name="Title 1">
             <a:extLst>
               <a:ext uri="{FF2B5EF4-FFF2-40B4-BE49-F238E27FC236}">
-                <a16:creationId xmlns:a16="http://schemas.microsoft.com/office/drawing/2014/main" id="{67423FAA-9D78-41BE-BEE2-6621D8D99B08}"/>
+                <a16:creationId xmlns:a16="http://schemas.microsoft.com/office/drawing/2014/main" id="{572B919B-7970-414F-944C-D7DCE41D5119}"/>
               </a:ext>
             </a:extLst>
           </p:cNvPr>
@@ -4703,7 +4816,7 @@
           <a:p>
             <a:r>
               <a:rPr lang="en-US" dirty="0"/>
-              <a:t>Use Case Diagram</a:t>
+              <a:t>Non-functional Requirements </a:t>
             </a:r>
           </a:p>
         </p:txBody>
@@ -4713,7 +4826,7 @@
           <p:cNvPr id="3" name="Content Placeholder 2">
             <a:extLst>
               <a:ext uri="{FF2B5EF4-FFF2-40B4-BE49-F238E27FC236}">
-                <a16:creationId xmlns:a16="http://schemas.microsoft.com/office/drawing/2014/main" id="{914A72A8-87B7-4A3E-8DAF-1E357F80BB47}"/>
+                <a16:creationId xmlns:a16="http://schemas.microsoft.com/office/drawing/2014/main" id="{57F44D35-13DB-4243-AAB8-F4DD4AA3E478}"/>
               </a:ext>
             </a:extLst>
           </p:cNvPr>
@@ -4729,14 +4842,23 @@
           <a:bodyPr/>
           <a:lstStyle/>
           <a:p>
-            <a:endParaRPr lang="en-US"/>
+            <a:r>
+              <a:rPr lang="en-US" dirty="0"/>
+              <a:t>The application must not lag for more than 0.002 seconds</a:t>
+            </a:r>
+          </a:p>
+          <a:p>
+            <a:pPr marL="0" indent="0">
+              <a:buNone/>
+            </a:pPr>
+            <a:endParaRPr lang="en-US" dirty="0"/>
           </a:p>
         </p:txBody>
       </p:sp>
     </p:spTree>
     <p:extLst>
       <p:ext uri="{BB962C8B-B14F-4D97-AF65-F5344CB8AC3E}">
-        <p14:creationId xmlns:p14="http://schemas.microsoft.com/office/powerpoint/2010/main" val="2694925301"/>
+        <p14:creationId xmlns:p14="http://schemas.microsoft.com/office/powerpoint/2010/main" val="110452088"/>
       </p:ext>
     </p:extLst>
   </p:cSld>
@@ -4768,7 +4890,7 @@
           <p:cNvPr id="2" name="Title 1">
             <a:extLst>
               <a:ext uri="{FF2B5EF4-FFF2-40B4-BE49-F238E27FC236}">
-                <a16:creationId xmlns:a16="http://schemas.microsoft.com/office/drawing/2014/main" id="{638922BD-D6C8-4838-A26C-ABDA8AAF1130}"/>
+                <a16:creationId xmlns:a16="http://schemas.microsoft.com/office/drawing/2014/main" id="{3AE0C9F6-F394-418D-96A4-49626E554771}"/>
               </a:ext>
             </a:extLst>
           </p:cNvPr>
@@ -4786,7 +4908,7 @@
           <a:p>
             <a:r>
               <a:rPr lang="en-US" dirty="0"/>
-              <a:t>System Sequence Diagram</a:t>
+              <a:t>Use case Diagram</a:t>
             </a:r>
           </a:p>
         </p:txBody>
@@ -4796,7 +4918,7 @@
           <p:cNvPr id="3" name="Content Placeholder 2">
             <a:extLst>
               <a:ext uri="{FF2B5EF4-FFF2-40B4-BE49-F238E27FC236}">
-                <a16:creationId xmlns:a16="http://schemas.microsoft.com/office/drawing/2014/main" id="{9DFF4C3E-86FA-4B7F-B010-8EE42A8D1C76}"/>
+                <a16:creationId xmlns:a16="http://schemas.microsoft.com/office/drawing/2014/main" id="{60780DC7-6E0C-499C-B432-5D3FAE7733F5}"/>
               </a:ext>
             </a:extLst>
           </p:cNvPr>
@@ -4812,14 +4934,65 @@
           <a:bodyPr/>
           <a:lstStyle/>
           <a:p>
-            <a:endParaRPr lang="en-US"/>
-          </a:p>
-        </p:txBody>
-      </p:sp>
+            <a:r>
+              <a:rPr lang="en-US" dirty="0"/>
+              <a:t>Main Menu</a:t>
+            </a:r>
+          </a:p>
+          <a:p>
+            <a:pPr marL="0" indent="0">
+              <a:buNone/>
+            </a:pPr>
+            <a:endParaRPr lang="en-US" dirty="0"/>
+          </a:p>
+        </p:txBody>
+      </p:sp>
+      <p:pic>
+        <p:nvPicPr>
+          <p:cNvPr id="4" name="Picture 3">
+            <a:extLst>
+              <a:ext uri="{FF2B5EF4-FFF2-40B4-BE49-F238E27FC236}">
+                <a16:creationId xmlns:a16="http://schemas.microsoft.com/office/drawing/2014/main" id="{C90B0524-6AAC-4739-8263-BBA3A39E4DA6}"/>
+              </a:ext>
+            </a:extLst>
+          </p:cNvPr>
+          <p:cNvPicPr/>
+          <p:nvPr/>
+        </p:nvPicPr>
+        <p:blipFill rotWithShape="1">
+          <a:blip r:embed="rId2">
+            <a:extLst>
+              <a:ext uri="{28A0092B-C50C-407E-A947-70E740481C1C}">
+                <a14:useLocalDpi xmlns:a14="http://schemas.microsoft.com/office/drawing/2010/main" val="0"/>
+              </a:ext>
+            </a:extLst>
+          </a:blip>
+          <a:srcRect l="19743" t="22857" r="24880" b="13429"/>
+          <a:stretch/>
+        </p:blipFill>
+        <p:spPr bwMode="auto">
+          <a:xfrm>
+            <a:off x="4700123" y="2171700"/>
+            <a:ext cx="6272677" cy="4118317"/>
+          </a:xfrm>
+          <a:prstGeom prst="rect">
+            <a:avLst/>
+          </a:prstGeom>
+          <a:noFill/>
+          <a:ln>
+            <a:noFill/>
+          </a:ln>
+          <a:extLst>
+            <a:ext uri="{53640926-AAD7-44D8-BBD7-CCE9431645EC}">
+              <a14:shadowObscured xmlns:a14="http://schemas.microsoft.com/office/drawing/2010/main"/>
+            </a:ext>
+          </a:extLst>
+        </p:spPr>
+      </p:pic>
     </p:spTree>
     <p:extLst>
       <p:ext uri="{BB962C8B-B14F-4D97-AF65-F5344CB8AC3E}">
-        <p14:creationId xmlns:p14="http://schemas.microsoft.com/office/powerpoint/2010/main" val="3323198618"/>
+        <p14:creationId xmlns:p14="http://schemas.microsoft.com/office/powerpoint/2010/main" val="2053961645"/>
       </p:ext>
     </p:extLst>
   </p:cSld>
@@ -4851,6 +5024,362 @@
           <p:cNvPr id="2" name="Title 1">
             <a:extLst>
               <a:ext uri="{FF2B5EF4-FFF2-40B4-BE49-F238E27FC236}">
+                <a16:creationId xmlns:a16="http://schemas.microsoft.com/office/drawing/2014/main" id="{67423FAA-9D78-41BE-BEE2-6621D8D99B08}"/>
+              </a:ext>
+            </a:extLst>
+          </p:cNvPr>
+          <p:cNvSpPr>
+            <a:spLocks noGrp="1"/>
+          </p:cNvSpPr>
+          <p:nvPr>
+            <p:ph type="title"/>
+          </p:nvPr>
+        </p:nvSpPr>
+        <p:spPr/>
+        <p:txBody>
+          <a:bodyPr/>
+          <a:lstStyle/>
+          <a:p>
+            <a:r>
+              <a:rPr lang="en-US" dirty="0"/>
+              <a:t>Use Case Diagram</a:t>
+            </a:r>
+          </a:p>
+        </p:txBody>
+      </p:sp>
+      <p:sp>
+        <p:nvSpPr>
+          <p:cNvPr id="3" name="Content Placeholder 2">
+            <a:extLst>
+              <a:ext uri="{FF2B5EF4-FFF2-40B4-BE49-F238E27FC236}">
+                <a16:creationId xmlns:a16="http://schemas.microsoft.com/office/drawing/2014/main" id="{914A72A8-87B7-4A3E-8DAF-1E357F80BB47}"/>
+              </a:ext>
+            </a:extLst>
+          </p:cNvPr>
+          <p:cNvSpPr>
+            <a:spLocks noGrp="1"/>
+          </p:cNvSpPr>
+          <p:nvPr>
+            <p:ph idx="1"/>
+          </p:nvPr>
+        </p:nvSpPr>
+        <p:spPr/>
+        <p:txBody>
+          <a:bodyPr/>
+          <a:lstStyle/>
+          <a:p>
+            <a:r>
+              <a:rPr lang="en-US" dirty="0"/>
+              <a:t>Game Mode</a:t>
+            </a:r>
+          </a:p>
+        </p:txBody>
+      </p:sp>
+      <p:pic>
+        <p:nvPicPr>
+          <p:cNvPr id="4" name="Picture 3">
+            <a:extLst>
+              <a:ext uri="{FF2B5EF4-FFF2-40B4-BE49-F238E27FC236}">
+                <a16:creationId xmlns:a16="http://schemas.microsoft.com/office/drawing/2014/main" id="{672F7595-69B9-4DAB-8322-2BABA7064F8B}"/>
+              </a:ext>
+            </a:extLst>
+          </p:cNvPr>
+          <p:cNvPicPr/>
+          <p:nvPr/>
+        </p:nvPicPr>
+        <p:blipFill rotWithShape="1">
+          <a:blip r:embed="rId2">
+            <a:extLst>
+              <a:ext uri="{28A0092B-C50C-407E-A947-70E740481C1C}">
+                <a14:useLocalDpi xmlns:a14="http://schemas.microsoft.com/office/drawing/2010/main" val="0"/>
+              </a:ext>
+            </a:extLst>
+          </a:blip>
+          <a:srcRect l="17978" t="23143" r="25682" b="12572"/>
+          <a:stretch/>
+        </p:blipFill>
+        <p:spPr bwMode="auto">
+          <a:xfrm>
+            <a:off x="4178104" y="2171700"/>
+            <a:ext cx="6794695" cy="4221479"/>
+          </a:xfrm>
+          <a:prstGeom prst="rect">
+            <a:avLst/>
+          </a:prstGeom>
+          <a:noFill/>
+          <a:ln>
+            <a:noFill/>
+          </a:ln>
+          <a:extLst>
+            <a:ext uri="{53640926-AAD7-44D8-BBD7-CCE9431645EC}">
+              <a14:shadowObscured xmlns:a14="http://schemas.microsoft.com/office/drawing/2010/main"/>
+            </a:ext>
+          </a:extLst>
+        </p:spPr>
+      </p:pic>
+    </p:spTree>
+    <p:extLst>
+      <p:ext uri="{BB962C8B-B14F-4D97-AF65-F5344CB8AC3E}">
+        <p14:creationId xmlns:p14="http://schemas.microsoft.com/office/powerpoint/2010/main" val="2694925301"/>
+      </p:ext>
+    </p:extLst>
+  </p:cSld>
+  <p:clrMapOvr>
+    <a:masterClrMapping/>
+  </p:clrMapOvr>
+</p:sld>
+</file>
+
+<file path=ppt/slides/slide16.xml><?xml version="1.0" encoding="utf-8"?>
+<p:sld xmlns:a="http://schemas.openxmlformats.org/drawingml/2006/main" xmlns:r="http://schemas.openxmlformats.org/officeDocument/2006/relationships" xmlns:p="http://schemas.openxmlformats.org/presentationml/2006/main">
+  <p:cSld>
+    <p:spTree>
+      <p:nvGrpSpPr>
+        <p:cNvPr id="1" name=""/>
+        <p:cNvGrpSpPr/>
+        <p:nvPr/>
+      </p:nvGrpSpPr>
+      <p:grpSpPr>
+        <a:xfrm>
+          <a:off x="0" y="0"/>
+          <a:ext cx="0" cy="0"/>
+          <a:chOff x="0" y="0"/>
+          <a:chExt cx="0" cy="0"/>
+        </a:xfrm>
+      </p:grpSpPr>
+      <p:sp>
+        <p:nvSpPr>
+          <p:cNvPr id="2" name="Title 1">
+            <a:extLst>
+              <a:ext uri="{FF2B5EF4-FFF2-40B4-BE49-F238E27FC236}">
+                <a16:creationId xmlns:a16="http://schemas.microsoft.com/office/drawing/2014/main" id="{AA652A55-4BBF-44C0-9483-296DC4886021}"/>
+              </a:ext>
+            </a:extLst>
+          </p:cNvPr>
+          <p:cNvSpPr>
+            <a:spLocks noGrp="1"/>
+          </p:cNvSpPr>
+          <p:nvPr>
+            <p:ph type="title"/>
+          </p:nvPr>
+        </p:nvSpPr>
+        <p:spPr/>
+        <p:txBody>
+          <a:bodyPr/>
+          <a:lstStyle/>
+          <a:p>
+            <a:r>
+              <a:rPr lang="en-US" dirty="0"/>
+              <a:t>Use Case Diagram</a:t>
+            </a:r>
+          </a:p>
+        </p:txBody>
+      </p:sp>
+      <p:sp>
+        <p:nvSpPr>
+          <p:cNvPr id="3" name="Content Placeholder 2">
+            <a:extLst>
+              <a:ext uri="{FF2B5EF4-FFF2-40B4-BE49-F238E27FC236}">
+                <a16:creationId xmlns:a16="http://schemas.microsoft.com/office/drawing/2014/main" id="{073B9CCF-CD4B-49EE-9419-06671F73F5B8}"/>
+              </a:ext>
+            </a:extLst>
+          </p:cNvPr>
+          <p:cNvSpPr>
+            <a:spLocks noGrp="1"/>
+          </p:cNvSpPr>
+          <p:nvPr>
+            <p:ph idx="1"/>
+          </p:nvPr>
+        </p:nvSpPr>
+        <p:spPr/>
+        <p:txBody>
+          <a:bodyPr/>
+          <a:lstStyle/>
+          <a:p>
+            <a:r>
+              <a:rPr lang="en-US" dirty="0"/>
+              <a:t>Tour Guide</a:t>
+            </a:r>
+          </a:p>
+        </p:txBody>
+      </p:sp>
+      <p:pic>
+        <p:nvPicPr>
+          <p:cNvPr id="4" name="Picture 3">
+            <a:extLst>
+              <a:ext uri="{FF2B5EF4-FFF2-40B4-BE49-F238E27FC236}">
+                <a16:creationId xmlns:a16="http://schemas.microsoft.com/office/drawing/2014/main" id="{57E421ED-8741-4E5A-9A62-E61BD04979A8}"/>
+              </a:ext>
+            </a:extLst>
+          </p:cNvPr>
+          <p:cNvPicPr/>
+          <p:nvPr/>
+        </p:nvPicPr>
+        <p:blipFill rotWithShape="1">
+          <a:blip r:embed="rId2">
+            <a:extLst>
+              <a:ext uri="{28A0092B-C50C-407E-A947-70E740481C1C}">
+                <a14:useLocalDpi xmlns:a14="http://schemas.microsoft.com/office/drawing/2010/main" val="0"/>
+              </a:ext>
+            </a:extLst>
+          </a:blip>
+          <a:srcRect l="23595" t="26000" r="23595" b="17143"/>
+          <a:stretch/>
+        </p:blipFill>
+        <p:spPr bwMode="auto">
+          <a:xfrm>
+            <a:off x="4758177" y="2286000"/>
+            <a:ext cx="6062223" cy="3996055"/>
+          </a:xfrm>
+          <a:prstGeom prst="rect">
+            <a:avLst/>
+          </a:prstGeom>
+          <a:noFill/>
+          <a:ln>
+            <a:noFill/>
+          </a:ln>
+          <a:extLst>
+            <a:ext uri="{53640926-AAD7-44D8-BBD7-CCE9431645EC}">
+              <a14:shadowObscured xmlns:a14="http://schemas.microsoft.com/office/drawing/2010/main"/>
+            </a:ext>
+          </a:extLst>
+        </p:spPr>
+      </p:pic>
+    </p:spTree>
+    <p:extLst>
+      <p:ext uri="{BB962C8B-B14F-4D97-AF65-F5344CB8AC3E}">
+        <p14:creationId xmlns:p14="http://schemas.microsoft.com/office/powerpoint/2010/main" val="2443139829"/>
+      </p:ext>
+    </p:extLst>
+  </p:cSld>
+  <p:clrMapOvr>
+    <a:masterClrMapping/>
+  </p:clrMapOvr>
+</p:sld>
+</file>
+
+<file path=ppt/slides/slide17.xml><?xml version="1.0" encoding="utf-8"?>
+<p:sld xmlns:a="http://schemas.openxmlformats.org/drawingml/2006/main" xmlns:r="http://schemas.openxmlformats.org/officeDocument/2006/relationships" xmlns:p="http://schemas.openxmlformats.org/presentationml/2006/main">
+  <p:cSld>
+    <p:spTree>
+      <p:nvGrpSpPr>
+        <p:cNvPr id="1" name=""/>
+        <p:cNvGrpSpPr/>
+        <p:nvPr/>
+      </p:nvGrpSpPr>
+      <p:grpSpPr>
+        <a:xfrm>
+          <a:off x="0" y="0"/>
+          <a:ext cx="0" cy="0"/>
+          <a:chOff x="0" y="0"/>
+          <a:chExt cx="0" cy="0"/>
+        </a:xfrm>
+      </p:grpSpPr>
+      <p:sp>
+        <p:nvSpPr>
+          <p:cNvPr id="2" name="Title 1">
+            <a:extLst>
+              <a:ext uri="{FF2B5EF4-FFF2-40B4-BE49-F238E27FC236}">
+                <a16:creationId xmlns:a16="http://schemas.microsoft.com/office/drawing/2014/main" id="{638922BD-D6C8-4838-A26C-ABDA8AAF1130}"/>
+              </a:ext>
+            </a:extLst>
+          </p:cNvPr>
+          <p:cNvSpPr>
+            <a:spLocks noGrp="1"/>
+          </p:cNvSpPr>
+          <p:nvPr>
+            <p:ph type="title"/>
+          </p:nvPr>
+        </p:nvSpPr>
+        <p:spPr/>
+        <p:txBody>
+          <a:bodyPr/>
+          <a:lstStyle/>
+          <a:p>
+            <a:r>
+              <a:rPr lang="en-US" dirty="0"/>
+              <a:t>System Sequence Diagram</a:t>
+            </a:r>
+          </a:p>
+        </p:txBody>
+      </p:sp>
+      <p:pic>
+        <p:nvPicPr>
+          <p:cNvPr id="4" name="Picture 3">
+            <a:extLst>
+              <a:ext uri="{FF2B5EF4-FFF2-40B4-BE49-F238E27FC236}">
+                <a16:creationId xmlns:a16="http://schemas.microsoft.com/office/drawing/2014/main" id="{28DE14FE-84BF-442E-9367-9DA52183980D}"/>
+              </a:ext>
+            </a:extLst>
+          </p:cNvPr>
+          <p:cNvPicPr/>
+          <p:nvPr/>
+        </p:nvPicPr>
+        <p:blipFill rotWithShape="1">
+          <a:blip r:embed="rId2">
+            <a:extLst>
+              <a:ext uri="{28A0092B-C50C-407E-A947-70E740481C1C}">
+                <a14:useLocalDpi xmlns:a14="http://schemas.microsoft.com/office/drawing/2010/main" val="0"/>
+              </a:ext>
+            </a:extLst>
+          </a:blip>
+          <a:srcRect r="6139" b="19380"/>
+          <a:stretch/>
+        </p:blipFill>
+        <p:spPr bwMode="auto">
+          <a:xfrm>
+            <a:off x="3151846" y="1288757"/>
+            <a:ext cx="7412991" cy="5421532"/>
+          </a:xfrm>
+          <a:prstGeom prst="rect">
+            <a:avLst/>
+          </a:prstGeom>
+          <a:noFill/>
+          <a:ln>
+            <a:noFill/>
+          </a:ln>
+          <a:extLst>
+            <a:ext uri="{53640926-AAD7-44D8-BBD7-CCE9431645EC}">
+              <a14:shadowObscured xmlns:a14="http://schemas.microsoft.com/office/drawing/2010/main"/>
+            </a:ext>
+          </a:extLst>
+        </p:spPr>
+      </p:pic>
+    </p:spTree>
+    <p:extLst>
+      <p:ext uri="{BB962C8B-B14F-4D97-AF65-F5344CB8AC3E}">
+        <p14:creationId xmlns:p14="http://schemas.microsoft.com/office/powerpoint/2010/main" val="3323198618"/>
+      </p:ext>
+    </p:extLst>
+  </p:cSld>
+  <p:clrMapOvr>
+    <a:masterClrMapping/>
+  </p:clrMapOvr>
+</p:sld>
+</file>
+
+<file path=ppt/slides/slide18.xml><?xml version="1.0" encoding="utf-8"?>
+<p:sld xmlns:a="http://schemas.openxmlformats.org/drawingml/2006/main" xmlns:r="http://schemas.openxmlformats.org/officeDocument/2006/relationships" xmlns:p="http://schemas.openxmlformats.org/presentationml/2006/main">
+  <p:cSld>
+    <p:spTree>
+      <p:nvGrpSpPr>
+        <p:cNvPr id="1" name=""/>
+        <p:cNvGrpSpPr/>
+        <p:nvPr/>
+      </p:nvGrpSpPr>
+      <p:grpSpPr>
+        <a:xfrm>
+          <a:off x="0" y="0"/>
+          <a:ext cx="0" cy="0"/>
+          <a:chOff x="0" y="0"/>
+          <a:chExt cx="0" cy="0"/>
+        </a:xfrm>
+      </p:grpSpPr>
+      <p:sp>
+        <p:nvSpPr>
+          <p:cNvPr id="2" name="Title 1">
+            <a:extLst>
+              <a:ext uri="{FF2B5EF4-FFF2-40B4-BE49-F238E27FC236}">
                 <a16:creationId xmlns:a16="http://schemas.microsoft.com/office/drawing/2014/main" id="{10532DA2-DA77-459D-901A-8AFDC5F1C4B0}"/>
               </a:ext>
             </a:extLst>
@@ -4912,7 +5441,7 @@
 </p:sld>
 </file>
 
-<file path=ppt/slides/slide16.xml><?xml version="1.0" encoding="utf-8"?>
+<file path=ppt/slides/slide19.xml><?xml version="1.0" encoding="utf-8"?>
 <p:sld xmlns:a="http://schemas.openxmlformats.org/drawingml/2006/main" xmlns:r="http://schemas.openxmlformats.org/officeDocument/2006/relationships" xmlns:p="http://schemas.openxmlformats.org/presentationml/2006/main">
   <p:cSld>
     <p:spTree>
@@ -5179,12 +5708,20 @@
           </a:p>
           <a:p>
             <a:r>
-              <a:rPr lang="en-US"/>
-              <a:t>Being </a:t>
-            </a:r>
-            <a:r>
               <a:rPr lang="en-US" dirty="0"/>
-              <a:t>of the top trending technology it will help evolve the education sector as well</a:t>
+              <a:t>Being one of the top trending technology it will help evolve the education sector as well</a:t>
+            </a:r>
+          </a:p>
+          <a:p>
+            <a:r>
+              <a:rPr lang="en-US" dirty="0"/>
+              <a:t>Developed application will allows kids to visualize Earths water cycle and easier for them to understand</a:t>
+            </a:r>
+          </a:p>
+          <a:p>
+            <a:r>
+              <a:rPr lang="en-US" dirty="0"/>
+              <a:t>As kids love to play games, we will include a mini game as it will make it easier to pass information to them.</a:t>
             </a:r>
           </a:p>
           <a:p>
@@ -5276,11 +5813,19 @@
           <a:p>
             <a:r>
               <a:rPr lang="en-US" dirty="0"/>
-              <a:t>Few </a:t>
-            </a:r>
-            <a:r>
-              <a:rPr lang="en-US"/>
-              <a:t>VR applications</a:t>
+              <a:t>Few VR applications</a:t>
+            </a:r>
+          </a:p>
+          <a:p>
+            <a:r>
+              <a:rPr lang="en-US" dirty="0"/>
+              <a:t>Lack of Guidance within the application</a:t>
+            </a:r>
+          </a:p>
+          <a:p>
+            <a:r>
+              <a:rPr lang="en-US" dirty="0"/>
+              <a:t>Lack of visualization</a:t>
             </a:r>
           </a:p>
         </p:txBody>
@@ -5364,7 +5909,31 @@
           <a:bodyPr/>
           <a:lstStyle/>
           <a:p>
-            <a:endParaRPr lang="en-US"/>
+            <a:r>
+              <a:rPr lang="en-US" dirty="0"/>
+              <a:t>to develop a virtual reality application for water cycle education.</a:t>
+            </a:r>
+          </a:p>
+          <a:p>
+            <a:r>
+              <a:rPr lang="en-US" dirty="0"/>
+              <a:t>to provide users with a game to understand water cycle.</a:t>
+            </a:r>
+          </a:p>
+          <a:p>
+            <a:r>
+              <a:rPr lang="en-US" dirty="0"/>
+              <a:t>to provide user with different mode of interaction.</a:t>
+            </a:r>
+          </a:p>
+          <a:p>
+            <a:r>
+              <a:rPr lang="en-US" dirty="0"/>
+              <a:t>to provide user with real model view of water cycle.</a:t>
+            </a:r>
+          </a:p>
+          <a:p>
+            <a:endParaRPr lang="en-US" dirty="0"/>
           </a:p>
         </p:txBody>
       </p:sp>
@@ -5447,7 +6016,22 @@
           <a:bodyPr/>
           <a:lstStyle/>
           <a:p>
-            <a:endParaRPr lang="en-US" dirty="0"/>
+            <a:r>
+              <a:rPr lang="en-US" dirty="0"/>
+              <a:t>The developed application will allow kids to have tour of different phases of water cycle</a:t>
+            </a:r>
+          </a:p>
+          <a:p>
+            <a:r>
+              <a:rPr lang="en-US" dirty="0"/>
+              <a:t>The developed application will guide kids through different phases with help of a robot companion</a:t>
+            </a:r>
+          </a:p>
+          <a:p>
+            <a:r>
+              <a:rPr lang="en-US" dirty="0"/>
+              <a:t>The developed application will have a mini game for kids as part of interaction.</a:t>
+            </a:r>
           </a:p>
         </p:txBody>
       </p:sp>

</xml_diff>